<commit_message>
update information about sdk
</commit_message>
<xml_diff>
--- a/media/device.pptx
+++ b/media/device.pptx
@@ -212,7 +212,7 @@
           <a:p>
             <a:fld id="{47277FB0-21EC-48C5-90B0-184600466A6C}" type="datetimeFigureOut">
               <a:rPr lang="zh-CN" altLang="en-US" smtClean="0"/>
-              <a:t>2018/11/30</a:t>
+              <a:t>2018/12/11</a:t>
             </a:fld>
             <a:endParaRPr lang="zh-CN" altLang="en-US"/>
           </a:p>
@@ -377,7 +377,7 @@
           <a:p>
             <a:fld id="{9C967889-4715-5C4F-A252-FFC716185AB6}" type="datetimeFigureOut">
               <a:rPr lang="en-US" smtClean="0"/>
-              <a:t>11/30/18</a:t>
+              <a:t>12/11/2018</a:t>
             </a:fld>
             <a:endParaRPr lang="en-US"/>
           </a:p>
@@ -6457,8 +6457,8 @@
           </p:nvSpPr>
           <p:spPr>
             <a:xfrm>
-              <a:off x="1387328" y="4635540"/>
-              <a:ext cx="1189749" cy="324641"/>
+              <a:off x="1441029" y="4635540"/>
+              <a:ext cx="1082348" cy="317395"/>
             </a:xfrm>
             <a:prstGeom prst="rect">
               <a:avLst/>
@@ -6477,34 +6477,14 @@
                 </a:lnSpc>
               </a:pPr>
               <a:r>
-                <a:rPr kumimoji="1" lang="en-US" altLang="zh-CN" sz="1400" dirty="0">
+                <a:rPr kumimoji="1" lang="zh-CN" altLang="en-US" sz="1400" dirty="0" smtClean="0">
                   <a:solidFill>
                     <a:srgbClr val="737893"/>
                   </a:solidFill>
                   <a:latin typeface="Helvetica" pitchFamily="2" charset="0"/>
                   <a:cs typeface="Arial" panose="020B0604020202020204" pitchFamily="34" charset="0"/>
                 </a:rPr>
-                <a:t>Wind</a:t>
-              </a:r>
-              <a:r>
-                <a:rPr kumimoji="1" lang="zh-CN" altLang="en-US" sz="1400" dirty="0">
-                  <a:solidFill>
-                    <a:srgbClr val="737893"/>
-                  </a:solidFill>
-                  <a:latin typeface="Helvetica" pitchFamily="2" charset="0"/>
-                  <a:cs typeface="Arial" panose="020B0604020202020204" pitchFamily="34" charset="0"/>
-                </a:rPr>
-                <a:t> </a:t>
-              </a:r>
-              <a:r>
-                <a:rPr kumimoji="1" lang="en-US" altLang="zh-CN" sz="1400" dirty="0">
-                  <a:solidFill>
-                    <a:srgbClr val="737893"/>
-                  </a:solidFill>
-                  <a:latin typeface="Helvetica" pitchFamily="2" charset="0"/>
-                  <a:cs typeface="Arial" panose="020B0604020202020204" pitchFamily="34" charset="0"/>
-                </a:rPr>
-                <a:t>turbine</a:t>
+                <a:t>风力发电机</a:t>
               </a:r>
               <a:endParaRPr kumimoji="1" lang="zh-CN" altLang="en-US" sz="1400" dirty="0">
                 <a:solidFill>
@@ -6906,8 +6886,8 @@
           </p:nvSpPr>
           <p:spPr>
             <a:xfrm>
-              <a:off x="2878253" y="4635540"/>
-              <a:ext cx="1189749" cy="324641"/>
+              <a:off x="2931954" y="4635540"/>
+              <a:ext cx="1082348" cy="317395"/>
             </a:xfrm>
             <a:prstGeom prst="rect">
               <a:avLst/>
@@ -6926,34 +6906,14 @@
                 </a:lnSpc>
               </a:pPr>
               <a:r>
-                <a:rPr kumimoji="1" lang="en-US" altLang="zh-CN" sz="1400" dirty="0">
+                <a:rPr kumimoji="1" lang="zh-CN" altLang="en-US" sz="1400" dirty="0" smtClean="0">
                   <a:solidFill>
                     <a:srgbClr val="737893"/>
                   </a:solidFill>
                   <a:latin typeface="Helvetica" pitchFamily="2" charset="0"/>
                   <a:cs typeface="Arial" panose="020B0604020202020204" pitchFamily="34" charset="0"/>
                 </a:rPr>
-                <a:t>Wind</a:t>
-              </a:r>
-              <a:r>
-                <a:rPr kumimoji="1" lang="zh-CN" altLang="en-US" sz="1400" dirty="0">
-                  <a:solidFill>
-                    <a:srgbClr val="737893"/>
-                  </a:solidFill>
-                  <a:latin typeface="Helvetica" pitchFamily="2" charset="0"/>
-                  <a:cs typeface="Arial" panose="020B0604020202020204" pitchFamily="34" charset="0"/>
-                </a:rPr>
-                <a:t> </a:t>
-              </a:r>
-              <a:r>
-                <a:rPr kumimoji="1" lang="en-US" altLang="zh-CN" sz="1400" dirty="0">
-                  <a:solidFill>
-                    <a:srgbClr val="737893"/>
-                  </a:solidFill>
-                  <a:latin typeface="Helvetica" pitchFamily="2" charset="0"/>
-                  <a:cs typeface="Arial" panose="020B0604020202020204" pitchFamily="34" charset="0"/>
-                </a:rPr>
-                <a:t>turbine</a:t>
+                <a:t>风力发电机</a:t>
               </a:r>
               <a:endParaRPr kumimoji="1" lang="zh-CN" altLang="en-US" sz="1400" dirty="0">
                 <a:solidFill>
@@ -7355,8 +7315,8 @@
           </p:nvSpPr>
           <p:spPr>
             <a:xfrm>
-              <a:off x="4447988" y="4635540"/>
-              <a:ext cx="1189749" cy="324641"/>
+              <a:off x="4501688" y="4635540"/>
+              <a:ext cx="1082348" cy="317395"/>
             </a:xfrm>
             <a:prstGeom prst="rect">
               <a:avLst/>
@@ -7375,34 +7335,14 @@
                 </a:lnSpc>
               </a:pPr>
               <a:r>
-                <a:rPr kumimoji="1" lang="en-US" altLang="zh-CN" sz="1400" dirty="0">
+                <a:rPr kumimoji="1" lang="zh-CN" altLang="en-US" sz="1400" dirty="0" smtClean="0">
                   <a:solidFill>
                     <a:srgbClr val="737893"/>
                   </a:solidFill>
                   <a:latin typeface="Helvetica" pitchFamily="2" charset="0"/>
                   <a:cs typeface="Arial" panose="020B0604020202020204" pitchFamily="34" charset="0"/>
                 </a:rPr>
-                <a:t>Wind</a:t>
-              </a:r>
-              <a:r>
-                <a:rPr kumimoji="1" lang="zh-CN" altLang="en-US" sz="1400" dirty="0">
-                  <a:solidFill>
-                    <a:srgbClr val="737893"/>
-                  </a:solidFill>
-                  <a:latin typeface="Helvetica" pitchFamily="2" charset="0"/>
-                  <a:cs typeface="Arial" panose="020B0604020202020204" pitchFamily="34" charset="0"/>
-                </a:rPr>
-                <a:t> </a:t>
-              </a:r>
-              <a:r>
-                <a:rPr kumimoji="1" lang="en-US" altLang="zh-CN" sz="1400" dirty="0">
-                  <a:solidFill>
-                    <a:srgbClr val="737893"/>
-                  </a:solidFill>
-                  <a:latin typeface="Helvetica" pitchFamily="2" charset="0"/>
-                  <a:cs typeface="Arial" panose="020B0604020202020204" pitchFamily="34" charset="0"/>
-                </a:rPr>
-                <a:t>turbine</a:t>
+                <a:t>风力发电机</a:t>
               </a:r>
               <a:endParaRPr kumimoji="1" lang="zh-CN" altLang="en-US" sz="1400" dirty="0">
                 <a:solidFill>
@@ -7804,8 +7744,8 @@
           </p:nvSpPr>
           <p:spPr>
             <a:xfrm>
-              <a:off x="5959609" y="4635540"/>
-              <a:ext cx="1189749" cy="324641"/>
+              <a:off x="6013313" y="4635540"/>
+              <a:ext cx="1082348" cy="317395"/>
             </a:xfrm>
             <a:prstGeom prst="rect">
               <a:avLst/>
@@ -7824,34 +7764,14 @@
                 </a:lnSpc>
               </a:pPr>
               <a:r>
-                <a:rPr kumimoji="1" lang="en-US" altLang="zh-CN" sz="1400" dirty="0">
+                <a:rPr kumimoji="1" lang="zh-CN" altLang="en-US" sz="1400" dirty="0" smtClean="0">
                   <a:solidFill>
                     <a:srgbClr val="737893"/>
                   </a:solidFill>
                   <a:latin typeface="Helvetica" pitchFamily="2" charset="0"/>
                   <a:cs typeface="Arial" panose="020B0604020202020204" pitchFamily="34" charset="0"/>
                 </a:rPr>
-                <a:t>Wind</a:t>
-              </a:r>
-              <a:r>
-                <a:rPr kumimoji="1" lang="zh-CN" altLang="en-US" sz="1400" dirty="0">
-                  <a:solidFill>
-                    <a:srgbClr val="737893"/>
-                  </a:solidFill>
-                  <a:latin typeface="Helvetica" pitchFamily="2" charset="0"/>
-                  <a:cs typeface="Arial" panose="020B0604020202020204" pitchFamily="34" charset="0"/>
-                </a:rPr>
-                <a:t> </a:t>
-              </a:r>
-              <a:r>
-                <a:rPr kumimoji="1" lang="en-US" altLang="zh-CN" sz="1400" dirty="0">
-                  <a:solidFill>
-                    <a:srgbClr val="737893"/>
-                  </a:solidFill>
-                  <a:latin typeface="Helvetica" pitchFamily="2" charset="0"/>
-                  <a:cs typeface="Arial" panose="020B0604020202020204" pitchFamily="34" charset="0"/>
-                </a:rPr>
-                <a:t>turbine</a:t>
+                <a:t>风力发电机</a:t>
               </a:r>
               <a:endParaRPr kumimoji="1" lang="zh-CN" altLang="en-US" sz="1400" dirty="0">
                 <a:solidFill>
@@ -11615,7 +11535,7 @@
             <a:blip r:embed="rId2">
               <a:extLst>
                 <a:ext uri="{96DAC541-7B7A-43D3-8B79-37D633B846F1}">
-                  <asvg:svgBlip xmlns:asvg="http://schemas.microsoft.com/office/drawing/2016/SVG/main" r:embed="rId3"/>
+                  <asvg:svgBlip xmlns:asvg="http://schemas.microsoft.com/office/drawing/2016/SVG/main" xmlns="" r:embed="rId3"/>
                 </a:ext>
               </a:extLst>
             </a:blip>
@@ -11695,7 +11615,7 @@
             <a:blip r:embed="rId2">
               <a:extLst>
                 <a:ext uri="{96DAC541-7B7A-43D3-8B79-37D633B846F1}">
-                  <asvg:svgBlip xmlns:asvg="http://schemas.microsoft.com/office/drawing/2016/SVG/main" r:embed="rId3"/>
+                  <asvg:svgBlip xmlns:asvg="http://schemas.microsoft.com/office/drawing/2016/SVG/main" xmlns="" r:embed="rId3"/>
                 </a:ext>
               </a:extLst>
             </a:blip>
@@ -14720,7 +14640,7 @@
             <a:blip r:embed="rId2">
               <a:extLst>
                 <a:ext uri="{96DAC541-7B7A-43D3-8B79-37D633B846F1}">
-                  <asvg:svgBlip xmlns:asvg="http://schemas.microsoft.com/office/drawing/2016/SVG/main" r:embed="rId3"/>
+                  <asvg:svgBlip xmlns:asvg="http://schemas.microsoft.com/office/drawing/2016/SVG/main" xmlns="" r:embed="rId3"/>
                 </a:ext>
               </a:extLst>
             </a:blip>
@@ -14800,7 +14720,7 @@
             <a:blip r:embed="rId2">
               <a:extLst>
                 <a:ext uri="{96DAC541-7B7A-43D3-8B79-37D633B846F1}">
-                  <asvg:svgBlip xmlns:asvg="http://schemas.microsoft.com/office/drawing/2016/SVG/main" r:embed="rId3"/>
+                  <asvg:svgBlip xmlns:asvg="http://schemas.microsoft.com/office/drawing/2016/SVG/main" xmlns="" r:embed="rId3"/>
                 </a:ext>
               </a:extLst>
             </a:blip>
@@ -14880,7 +14800,7 @@
             <a:blip r:embed="rId2">
               <a:extLst>
                 <a:ext uri="{96DAC541-7B7A-43D3-8B79-37D633B846F1}">
-                  <asvg:svgBlip xmlns:asvg="http://schemas.microsoft.com/office/drawing/2016/SVG/main" r:embed="rId3"/>
+                  <asvg:svgBlip xmlns:asvg="http://schemas.microsoft.com/office/drawing/2016/SVG/main" xmlns="" r:embed="rId3"/>
                 </a:ext>
               </a:extLst>
             </a:blip>
@@ -19339,10 +19259,10 @@
         </p:nvGrpSpPr>
         <p:grpSpPr>
           <a:xfrm>
-            <a:off x="584775" y="275299"/>
-            <a:ext cx="11607225" cy="6422295"/>
-            <a:chOff x="584775" y="275299"/>
-            <a:chExt cx="11607225" cy="6422295"/>
+            <a:off x="854243" y="275299"/>
+            <a:ext cx="10893725" cy="6422295"/>
+            <a:chOff x="854243" y="275299"/>
+            <a:chExt cx="10893725" cy="6422295"/>
           </a:xfrm>
         </p:grpSpPr>
         <p:sp>
@@ -19446,7 +19366,7 @@
             <a:p>
               <a:pPr algn="ctr"/>
               <a:r>
-                <a:rPr kumimoji="1" lang="en-US" altLang="zh-CN" sz="1600" b="1" dirty="0" err="1">
+                <a:rPr kumimoji="1" lang="en-US" altLang="zh-CN" sz="1600" b="1" dirty="0" err="1" smtClean="0">
                   <a:solidFill>
                     <a:srgbClr val="5E6280"/>
                   </a:solidFill>
@@ -19464,13 +19384,22 @@
                 <a:t> </a:t>
               </a:r>
               <a:r>
-                <a:rPr kumimoji="1" lang="en-US" altLang="zh-CN" sz="1600" b="1" dirty="0">
+                <a:rPr kumimoji="1" lang="en-US" altLang="zh-CN" sz="1600" b="1" dirty="0" smtClean="0">
                   <a:solidFill>
                     <a:srgbClr val="5E6280"/>
                   </a:solidFill>
                   <a:latin typeface="Helvetica" pitchFamily="2" charset="0"/>
                 </a:rPr>
-                <a:t>cloud</a:t>
+                <a:t>C</a:t>
+              </a:r>
+              <a:r>
+                <a:rPr kumimoji="1" lang="en-US" altLang="zh-CN" sz="1600" b="1" dirty="0" smtClean="0">
+                  <a:solidFill>
+                    <a:srgbClr val="5E6280"/>
+                  </a:solidFill>
+                  <a:latin typeface="Helvetica" pitchFamily="2" charset="0"/>
+                </a:rPr>
+                <a:t>loud</a:t>
               </a:r>
               <a:endParaRPr kumimoji="1" lang="zh-CN" altLang="en-US" sz="1600" b="1" dirty="0">
                 <a:solidFill>
@@ -20435,8 +20364,8 @@
           </p:nvSpPr>
           <p:spPr>
             <a:xfrm>
-              <a:off x="584775" y="4074212"/>
-              <a:ext cx="936475" cy="646331"/>
+              <a:off x="854243" y="3889546"/>
+              <a:ext cx="492443" cy="830997"/>
             </a:xfrm>
             <a:prstGeom prst="rect">
               <a:avLst/>
@@ -20449,33 +20378,50 @@
             </a:bodyPr>
             <a:lstStyle/>
             <a:p>
+              <a:endParaRPr kumimoji="1" lang="zh-CN" altLang="en-US" sz="1200" dirty="0">
+                <a:solidFill>
+                  <a:srgbClr val="BCBDD0"/>
+                </a:solidFill>
+              </a:endParaRPr>
+            </a:p>
+            <a:p>
               <a:r>
-                <a:rPr kumimoji="1" lang="en-US" altLang="zh-CN" sz="1200" dirty="0">
+                <a:rPr kumimoji="1" lang="zh-CN" altLang="en-US" sz="1200" dirty="0" smtClean="0">
                   <a:solidFill>
                     <a:srgbClr val="BCBDD0"/>
                   </a:solidFill>
                 </a:rPr>
-                <a:t>Device</a:t>
+                <a:t>设备</a:t>
               </a:r>
+              <a:endParaRPr kumimoji="1" lang="en-US" altLang="zh-CN" sz="1200" dirty="0" smtClean="0">
+                <a:solidFill>
+                  <a:srgbClr val="BCBDD0"/>
+                </a:solidFill>
+              </a:endParaRPr>
             </a:p>
             <a:p>
               <a:r>
-                <a:rPr kumimoji="1" lang="en-US" altLang="zh-CN" sz="1200" dirty="0">
+                <a:rPr kumimoji="1" lang="zh-CN" altLang="en-US" sz="1200" dirty="0" smtClean="0">
                   <a:solidFill>
                     <a:srgbClr val="BCBDD0"/>
                   </a:solidFill>
                 </a:rPr>
-                <a:t>registration</a:t>
+                <a:t>注册</a:t>
               </a:r>
+              <a:endParaRPr kumimoji="1" lang="en-US" altLang="zh-CN" sz="1200" dirty="0">
+                <a:solidFill>
+                  <a:srgbClr val="BCBDD0"/>
+                </a:solidFill>
+              </a:endParaRPr>
             </a:p>
             <a:p>
               <a:r>
-                <a:rPr kumimoji="1" lang="en-US" altLang="zh-CN" sz="1200" dirty="0">
+                <a:rPr kumimoji="1" lang="zh-CN" altLang="en-US" sz="1200" dirty="0" smtClean="0">
                   <a:solidFill>
                     <a:srgbClr val="BCBDD0"/>
                   </a:solidFill>
                 </a:rPr>
-                <a:t>service</a:t>
+                <a:t>服务</a:t>
               </a:r>
               <a:endParaRPr kumimoji="1" lang="zh-CN" altLang="en-US" sz="1200" dirty="0">
                 <a:solidFill>
@@ -20684,8 +20630,8 @@
           </p:nvSpPr>
           <p:spPr>
             <a:xfrm>
-              <a:off x="2191582" y="5952860"/>
-              <a:ext cx="742512" cy="324641"/>
+              <a:off x="2290968" y="5952860"/>
+              <a:ext cx="543739" cy="317395"/>
             </a:xfrm>
             <a:prstGeom prst="rect">
               <a:avLst/>
@@ -20704,14 +20650,14 @@
                 </a:lnSpc>
               </a:pPr>
               <a:r>
-                <a:rPr kumimoji="1" lang="en-US" altLang="zh-CN" sz="1400" dirty="0">
+                <a:rPr kumimoji="1" lang="zh-CN" altLang="en-US" sz="1400" dirty="0">
                   <a:solidFill>
                     <a:srgbClr val="737893"/>
                   </a:solidFill>
                   <a:latin typeface="Helvetica" pitchFamily="2" charset="0"/>
                   <a:cs typeface="Arial" panose="020B0604020202020204" pitchFamily="34" charset="0"/>
                 </a:rPr>
-                <a:t>Device</a:t>
+                <a:t>设备</a:t>
               </a:r>
               <a:endParaRPr kumimoji="1" lang="zh-CN" altLang="en-US" sz="1400" dirty="0">
                 <a:solidFill>
@@ -20737,8 +20683,8 @@
           </p:nvSpPr>
           <p:spPr>
             <a:xfrm>
-              <a:off x="3636968" y="5952860"/>
-              <a:ext cx="854721" cy="568297"/>
+              <a:off x="3523155" y="5962388"/>
+              <a:ext cx="1082348" cy="317395"/>
             </a:xfrm>
             <a:prstGeom prst="rect">
               <a:avLst/>
@@ -20757,26 +20703,6 @@
                 </a:lnSpc>
               </a:pPr>
               <a:r>
-                <a:rPr kumimoji="1" lang="en-US" altLang="zh-CN" sz="1400" dirty="0">
-                  <a:solidFill>
-                    <a:srgbClr val="737893"/>
-                  </a:solidFill>
-                  <a:latin typeface="Helvetica" pitchFamily="2" charset="0"/>
-                  <a:cs typeface="Arial" panose="020B0604020202020204" pitchFamily="34" charset="0"/>
-                </a:rPr>
-                <a:t>3</a:t>
-              </a:r>
-              <a:r>
-                <a:rPr kumimoji="1" lang="en-US" altLang="zh-CN" sz="1400" baseline="30000" dirty="0">
-                  <a:solidFill>
-                    <a:srgbClr val="737893"/>
-                  </a:solidFill>
-                  <a:latin typeface="Helvetica" pitchFamily="2" charset="0"/>
-                  <a:cs typeface="Arial" panose="020B0604020202020204" pitchFamily="34" charset="0"/>
-                </a:rPr>
-                <a:t>rd</a:t>
-              </a:r>
-              <a:r>
                 <a:rPr kumimoji="1" lang="zh-CN" altLang="en-US" sz="1400" dirty="0">
                   <a:solidFill>
                     <a:srgbClr val="737893"/>
@@ -20784,34 +20710,17 @@
                   <a:latin typeface="Helvetica" pitchFamily="2" charset="0"/>
                   <a:cs typeface="Arial" panose="020B0604020202020204" pitchFamily="34" charset="0"/>
                 </a:rPr>
-                <a:t> </a:t>
+                <a:t>第三</a:t>
               </a:r>
               <a:r>
-                <a:rPr kumimoji="1" lang="en-US" altLang="zh-CN" sz="1400" dirty="0">
+                <a:rPr kumimoji="1" lang="zh-CN" altLang="en-US" sz="1400" dirty="0" smtClean="0">
                   <a:solidFill>
                     <a:srgbClr val="737893"/>
                   </a:solidFill>
                   <a:latin typeface="Helvetica" pitchFamily="2" charset="0"/>
                   <a:cs typeface="Arial" panose="020B0604020202020204" pitchFamily="34" charset="0"/>
                 </a:rPr>
-                <a:t>Party</a:t>
-              </a:r>
-            </a:p>
-            <a:p>
-              <a:pPr algn="ctr">
-                <a:lnSpc>
-                  <a:spcPts val="1880"/>
-                </a:lnSpc>
-              </a:pPr>
-              <a:r>
-                <a:rPr kumimoji="1" lang="en-US" altLang="zh-CN" sz="1400" dirty="0">
-                  <a:solidFill>
-                    <a:srgbClr val="737893"/>
-                  </a:solidFill>
-                  <a:latin typeface="Helvetica" pitchFamily="2" charset="0"/>
-                  <a:cs typeface="Arial" panose="020B0604020202020204" pitchFamily="34" charset="0"/>
-                </a:rPr>
-                <a:t>System</a:t>
+                <a:t>方系统</a:t>
               </a:r>
               <a:endParaRPr kumimoji="1" lang="zh-CN" altLang="en-US" sz="1400" dirty="0">
                 <a:solidFill>
@@ -20837,8 +20746,8 @@
           </p:nvSpPr>
           <p:spPr>
             <a:xfrm>
-              <a:off x="5198118" y="5952860"/>
-              <a:ext cx="742512" cy="324641"/>
+              <a:off x="5297504" y="5952860"/>
+              <a:ext cx="543739" cy="317395"/>
             </a:xfrm>
             <a:prstGeom prst="rect">
               <a:avLst/>
@@ -20857,14 +20766,14 @@
                 </a:lnSpc>
               </a:pPr>
               <a:r>
-                <a:rPr kumimoji="1" lang="en-US" altLang="zh-CN" sz="1400" dirty="0">
+                <a:rPr kumimoji="1" lang="zh-CN" altLang="en-US" sz="1400" dirty="0">
                   <a:solidFill>
                     <a:srgbClr val="737893"/>
                   </a:solidFill>
                   <a:latin typeface="Helvetica" pitchFamily="2" charset="0"/>
                   <a:cs typeface="Arial" panose="020B0604020202020204" pitchFamily="34" charset="0"/>
                 </a:rPr>
-                <a:t>Device</a:t>
+                <a:t>设备</a:t>
               </a:r>
               <a:endParaRPr kumimoji="1" lang="zh-CN" altLang="en-US" sz="1400" dirty="0">
                 <a:solidFill>
@@ -20890,8 +20799,8 @@
           </p:nvSpPr>
           <p:spPr>
             <a:xfrm>
-              <a:off x="6650460" y="5952860"/>
-              <a:ext cx="854721" cy="568297"/>
+              <a:off x="6536647" y="5952860"/>
+              <a:ext cx="1082348" cy="317395"/>
             </a:xfrm>
             <a:prstGeom prst="rect">
               <a:avLst/>
@@ -20910,26 +20819,6 @@
                 </a:lnSpc>
               </a:pPr>
               <a:r>
-                <a:rPr kumimoji="1" lang="en-US" altLang="zh-CN" sz="1400" dirty="0">
-                  <a:solidFill>
-                    <a:srgbClr val="737893"/>
-                  </a:solidFill>
-                  <a:latin typeface="Helvetica" pitchFamily="2" charset="0"/>
-                  <a:cs typeface="Arial" panose="020B0604020202020204" pitchFamily="34" charset="0"/>
-                </a:rPr>
-                <a:t>3</a:t>
-              </a:r>
-              <a:r>
-                <a:rPr kumimoji="1" lang="en-US" altLang="zh-CN" sz="1400" baseline="30000" dirty="0">
-                  <a:solidFill>
-                    <a:srgbClr val="737893"/>
-                  </a:solidFill>
-                  <a:latin typeface="Helvetica" pitchFamily="2" charset="0"/>
-                  <a:cs typeface="Arial" panose="020B0604020202020204" pitchFamily="34" charset="0"/>
-                </a:rPr>
-                <a:t>rd</a:t>
-              </a:r>
-              <a:r>
                 <a:rPr kumimoji="1" lang="zh-CN" altLang="en-US" sz="1400" dirty="0">
                   <a:solidFill>
                     <a:srgbClr val="737893"/>
@@ -20937,34 +20826,7 @@
                   <a:latin typeface="Helvetica" pitchFamily="2" charset="0"/>
                   <a:cs typeface="Arial" panose="020B0604020202020204" pitchFamily="34" charset="0"/>
                 </a:rPr>
-                <a:t> </a:t>
-              </a:r>
-              <a:r>
-                <a:rPr kumimoji="1" lang="en-US" altLang="zh-CN" sz="1400" dirty="0">
-                  <a:solidFill>
-                    <a:srgbClr val="737893"/>
-                  </a:solidFill>
-                  <a:latin typeface="Helvetica" pitchFamily="2" charset="0"/>
-                  <a:cs typeface="Arial" panose="020B0604020202020204" pitchFamily="34" charset="0"/>
-                </a:rPr>
-                <a:t>Party</a:t>
-              </a:r>
-            </a:p>
-            <a:p>
-              <a:pPr algn="ctr">
-                <a:lnSpc>
-                  <a:spcPts val="1880"/>
-                </a:lnSpc>
-              </a:pPr>
-              <a:r>
-                <a:rPr kumimoji="1" lang="en-US" altLang="zh-CN" sz="1400" dirty="0">
-                  <a:solidFill>
-                    <a:srgbClr val="737893"/>
-                  </a:solidFill>
-                  <a:latin typeface="Helvetica" pitchFamily="2" charset="0"/>
-                  <a:cs typeface="Arial" panose="020B0604020202020204" pitchFamily="34" charset="0"/>
-                </a:rPr>
-                <a:t>System</a:t>
+                <a:t>第三方系统</a:t>
               </a:r>
               <a:endParaRPr kumimoji="1" lang="zh-CN" altLang="en-US" sz="1400" dirty="0">
                 <a:solidFill>
@@ -20994,7 +20856,7 @@
             <a:blip r:embed="rId2">
               <a:extLst>
                 <a:ext uri="{96DAC541-7B7A-43D3-8B79-37D633B846F1}">
-                  <asvg:svgBlip xmlns:asvg="http://schemas.microsoft.com/office/drawing/2016/SVG/main" r:embed="rId3"/>
+                  <asvg:svgBlip xmlns:asvg="http://schemas.microsoft.com/office/drawing/2016/SVG/main" xmlns="" r:embed="rId3"/>
                 </a:ext>
               </a:extLst>
             </a:blip>
@@ -21030,7 +20892,7 @@
             <a:blip r:embed="rId2">
               <a:extLst>
                 <a:ext uri="{96DAC541-7B7A-43D3-8B79-37D633B846F1}">
-                  <asvg:svgBlip xmlns:asvg="http://schemas.microsoft.com/office/drawing/2016/SVG/main" r:embed="rId3"/>
+                  <asvg:svgBlip xmlns:asvg="http://schemas.microsoft.com/office/drawing/2016/SVG/main" xmlns="" r:embed="rId3"/>
                 </a:ext>
               </a:extLst>
             </a:blip>
@@ -21066,7 +20928,7 @@
             <a:blip r:embed="rId2">
               <a:extLst>
                 <a:ext uri="{96DAC541-7B7A-43D3-8B79-37D633B846F1}">
-                  <asvg:svgBlip xmlns:asvg="http://schemas.microsoft.com/office/drawing/2016/SVG/main" r:embed="rId3"/>
+                  <asvg:svgBlip xmlns:asvg="http://schemas.microsoft.com/office/drawing/2016/SVG/main" xmlns="" r:embed="rId3"/>
                 </a:ext>
               </a:extLst>
             </a:blip>
@@ -21102,7 +20964,7 @@
             <a:blip r:embed="rId2">
               <a:extLst>
                 <a:ext uri="{96DAC541-7B7A-43D3-8B79-37D633B846F1}">
-                  <asvg:svgBlip xmlns:asvg="http://schemas.microsoft.com/office/drawing/2016/SVG/main" r:embed="rId3"/>
+                  <asvg:svgBlip xmlns:asvg="http://schemas.microsoft.com/office/drawing/2016/SVG/main" xmlns="" r:embed="rId3"/>
                 </a:ext>
               </a:extLst>
             </a:blip>
@@ -21250,8 +21112,8 @@
           </p:nvSpPr>
           <p:spPr>
             <a:xfrm>
-              <a:off x="8214679" y="5952860"/>
-              <a:ext cx="742512" cy="324641"/>
+              <a:off x="8314065" y="5952860"/>
+              <a:ext cx="543739" cy="317395"/>
             </a:xfrm>
             <a:prstGeom prst="rect">
               <a:avLst/>
@@ -21270,14 +21132,14 @@
                 </a:lnSpc>
               </a:pPr>
               <a:r>
-                <a:rPr kumimoji="1" lang="en-US" altLang="zh-CN" sz="1400" dirty="0">
+                <a:rPr kumimoji="1" lang="zh-CN" altLang="en-US" sz="1400" dirty="0">
                   <a:solidFill>
                     <a:srgbClr val="737893"/>
                   </a:solidFill>
                   <a:latin typeface="Helvetica" pitchFamily="2" charset="0"/>
                   <a:cs typeface="Arial" panose="020B0604020202020204" pitchFamily="34" charset="0"/>
                 </a:rPr>
-                <a:t>Device</a:t>
+                <a:t>设备</a:t>
               </a:r>
               <a:endParaRPr kumimoji="1" lang="zh-CN" altLang="en-US" sz="1400" dirty="0">
                 <a:solidFill>
@@ -21303,8 +21165,8 @@
           </p:nvSpPr>
           <p:spPr>
             <a:xfrm>
-              <a:off x="9667021" y="5952860"/>
-              <a:ext cx="854721" cy="568297"/>
+              <a:off x="9553208" y="5952860"/>
+              <a:ext cx="1082348" cy="317395"/>
             </a:xfrm>
             <a:prstGeom prst="rect">
               <a:avLst/>
@@ -21323,26 +21185,6 @@
                 </a:lnSpc>
               </a:pPr>
               <a:r>
-                <a:rPr kumimoji="1" lang="en-US" altLang="zh-CN" sz="1400" dirty="0">
-                  <a:solidFill>
-                    <a:srgbClr val="737893"/>
-                  </a:solidFill>
-                  <a:latin typeface="Helvetica" pitchFamily="2" charset="0"/>
-                  <a:cs typeface="Arial" panose="020B0604020202020204" pitchFamily="34" charset="0"/>
-                </a:rPr>
-                <a:t>3</a:t>
-              </a:r>
-              <a:r>
-                <a:rPr kumimoji="1" lang="en-US" altLang="zh-CN" sz="1400" baseline="30000" dirty="0">
-                  <a:solidFill>
-                    <a:srgbClr val="737893"/>
-                  </a:solidFill>
-                  <a:latin typeface="Helvetica" pitchFamily="2" charset="0"/>
-                  <a:cs typeface="Arial" panose="020B0604020202020204" pitchFamily="34" charset="0"/>
-                </a:rPr>
-                <a:t>rd</a:t>
-              </a:r>
-              <a:r>
                 <a:rPr kumimoji="1" lang="zh-CN" altLang="en-US" sz="1400" dirty="0">
                   <a:solidFill>
                     <a:srgbClr val="737893"/>
@@ -21350,34 +21192,7 @@
                   <a:latin typeface="Helvetica" pitchFamily="2" charset="0"/>
                   <a:cs typeface="Arial" panose="020B0604020202020204" pitchFamily="34" charset="0"/>
                 </a:rPr>
-                <a:t> </a:t>
-              </a:r>
-              <a:r>
-                <a:rPr kumimoji="1" lang="en-US" altLang="zh-CN" sz="1400" dirty="0">
-                  <a:solidFill>
-                    <a:srgbClr val="737893"/>
-                  </a:solidFill>
-                  <a:latin typeface="Helvetica" pitchFamily="2" charset="0"/>
-                  <a:cs typeface="Arial" panose="020B0604020202020204" pitchFamily="34" charset="0"/>
-                </a:rPr>
-                <a:t>Party</a:t>
-              </a:r>
-            </a:p>
-            <a:p>
-              <a:pPr algn="ctr">
-                <a:lnSpc>
-                  <a:spcPts val="1880"/>
-                </a:lnSpc>
-              </a:pPr>
-              <a:r>
-                <a:rPr kumimoji="1" lang="en-US" altLang="zh-CN" sz="1400" dirty="0">
-                  <a:solidFill>
-                    <a:srgbClr val="737893"/>
-                  </a:solidFill>
-                  <a:latin typeface="Helvetica" pitchFamily="2" charset="0"/>
-                  <a:cs typeface="Arial" panose="020B0604020202020204" pitchFamily="34" charset="0"/>
-                </a:rPr>
-                <a:t>System</a:t>
+                <a:t>第三方系统</a:t>
               </a:r>
               <a:endParaRPr kumimoji="1" lang="zh-CN" altLang="en-US" sz="1400" dirty="0">
                 <a:solidFill>
@@ -21407,7 +21222,7 @@
             <a:blip r:embed="rId2">
               <a:extLst>
                 <a:ext uri="{96DAC541-7B7A-43D3-8B79-37D633B846F1}">
-                  <asvg:svgBlip xmlns:asvg="http://schemas.microsoft.com/office/drawing/2016/SVG/main" r:embed="rId3"/>
+                  <asvg:svgBlip xmlns:asvg="http://schemas.microsoft.com/office/drawing/2016/SVG/main" xmlns="" r:embed="rId3"/>
                 </a:ext>
               </a:extLst>
             </a:blip>
@@ -21443,7 +21258,7 @@
             <a:blip r:embed="rId2">
               <a:extLst>
                 <a:ext uri="{96DAC541-7B7A-43D3-8B79-37D633B846F1}">
-                  <asvg:svgBlip xmlns:asvg="http://schemas.microsoft.com/office/drawing/2016/SVG/main" r:embed="rId3"/>
+                  <asvg:svgBlip xmlns:asvg="http://schemas.microsoft.com/office/drawing/2016/SVG/main" xmlns="" r:embed="rId3"/>
                 </a:ext>
               </a:extLst>
             </a:blip>
@@ -21534,7 +21349,16 @@
                   </a:solidFill>
                   <a:latin typeface="Helvetica" pitchFamily="2" charset="0"/>
                 </a:rPr>
-                <a:t>gateway</a:t>
+                <a:t>G</a:t>
+              </a:r>
+              <a:r>
+                <a:rPr kumimoji="1" lang="en-US" altLang="zh-CN" sz="1600" b="1" dirty="0" smtClean="0">
+                  <a:solidFill>
+                    <a:srgbClr val="5E6280"/>
+                  </a:solidFill>
+                  <a:latin typeface="Helvetica" pitchFamily="2" charset="0"/>
+                </a:rPr>
+                <a:t>ateway</a:t>
               </a:r>
               <a:endParaRPr kumimoji="1" lang="zh-CN" altLang="en-US" sz="1600" b="1" dirty="0">
                 <a:solidFill>
@@ -21877,7 +21701,7 @@
                 <a:t> </a:t>
               </a:r>
               <a:r>
-                <a:rPr lang="en-US" altLang="zh-CN" sz="1600" b="1" dirty="0">
+                <a:rPr lang="en-US" altLang="zh-CN" sz="1600" b="1" dirty="0" smtClean="0">
                   <a:solidFill>
                     <a:srgbClr val="5E6280"/>
                   </a:solidFill>
@@ -21889,15 +21713,15 @@
             <a:p>
               <a:pPr algn="ctr"/>
               <a:r>
-                <a:rPr lang="en-US" altLang="zh-CN" sz="1600" b="1" dirty="0">
+                <a:rPr lang="zh-CN" altLang="en-US" sz="1600" b="1" dirty="0">
                   <a:solidFill>
                     <a:srgbClr val="5E6280"/>
                   </a:solidFill>
                   <a:latin typeface="Helvetica" pitchFamily="2" charset="0"/>
                 </a:rPr>
-                <a:t>Clusters</a:t>
+                <a:t>集群</a:t>
               </a:r>
-              <a:endParaRPr lang="zh-CN" altLang="en-US" sz="1600" b="1" dirty="0">
+              <a:endParaRPr lang="en-US" altLang="zh-CN" sz="1600" b="1" dirty="0" smtClean="0">
                 <a:solidFill>
                   <a:srgbClr val="5E6280"/>
                 </a:solidFill>
@@ -22558,7 +22382,7 @@
           <p:spPr>
             <a:xfrm>
               <a:off x="11255525" y="4074212"/>
-              <a:ext cx="936475" cy="646331"/>
+              <a:ext cx="492443" cy="646331"/>
             </a:xfrm>
             <a:prstGeom prst="rect">
               <a:avLst/>
@@ -22572,32 +22396,42 @@
             <a:lstStyle/>
             <a:p>
               <a:r>
-                <a:rPr kumimoji="1" lang="en-US" altLang="zh-CN" sz="1200" dirty="0">
+                <a:rPr kumimoji="1" lang="zh-CN" altLang="en-US" sz="1200" dirty="0" smtClean="0">
                   <a:solidFill>
                     <a:srgbClr val="BCBDD0"/>
                   </a:solidFill>
                 </a:rPr>
-                <a:t>Device</a:t>
+                <a:t>设备</a:t>
               </a:r>
+              <a:endParaRPr kumimoji="1" lang="en-US" altLang="zh-CN" sz="1200" dirty="0" smtClean="0">
+                <a:solidFill>
+                  <a:srgbClr val="BCBDD0"/>
+                </a:solidFill>
+              </a:endParaRPr>
             </a:p>
             <a:p>
               <a:r>
-                <a:rPr kumimoji="1" lang="en-US" altLang="zh-CN" sz="1200" dirty="0">
+                <a:rPr kumimoji="1" lang="zh-CN" altLang="en-US" sz="1200" dirty="0" smtClean="0">
                   <a:solidFill>
                     <a:srgbClr val="BCBDD0"/>
                   </a:solidFill>
                 </a:rPr>
-                <a:t>registration</a:t>
+                <a:t>注册</a:t>
               </a:r>
+              <a:endParaRPr kumimoji="1" lang="en-US" altLang="zh-CN" sz="1200" dirty="0">
+                <a:solidFill>
+                  <a:srgbClr val="BCBDD0"/>
+                </a:solidFill>
+              </a:endParaRPr>
             </a:p>
             <a:p>
               <a:r>
-                <a:rPr kumimoji="1" lang="en-US" altLang="zh-CN" sz="1200" dirty="0">
+                <a:rPr kumimoji="1" lang="zh-CN" altLang="en-US" sz="1200" dirty="0">
                   <a:solidFill>
                     <a:srgbClr val="BCBDD0"/>
                   </a:solidFill>
                 </a:rPr>
-                <a:t>service</a:t>
+                <a:t>服务</a:t>
               </a:r>
               <a:endParaRPr kumimoji="1" lang="zh-CN" altLang="en-US" sz="1200" dirty="0">
                 <a:solidFill>
@@ -22622,7 +22456,7 @@
           <p:spPr>
             <a:xfrm>
               <a:off x="10090072" y="4261195"/>
-              <a:ext cx="945172" cy="646331"/>
+              <a:ext cx="945172" cy="461665"/>
             </a:xfrm>
             <a:prstGeom prst="rect">
               <a:avLst/>
@@ -22636,49 +22470,34 @@
             <a:p>
               <a:pPr algn="ctr"/>
               <a:r>
-                <a:rPr kumimoji="1" lang="en-US" altLang="zh-CN" sz="1200" dirty="0">
+                <a:rPr kumimoji="1" lang="zh-CN" altLang="en-US" sz="1200" dirty="0" smtClean="0">
                   <a:solidFill>
                     <a:srgbClr val="D8D9E7"/>
                   </a:solidFill>
                   <a:cs typeface="Devanagari MT" panose="02000500020000000000" pitchFamily="2" charset="0"/>
                 </a:rPr>
-                <a:t>Proprietary</a:t>
+                <a:t>专有</a:t>
               </a:r>
-            </a:p>
-            <a:p>
-              <a:pPr algn="ctr"/>
               <a:r>
-                <a:rPr kumimoji="1" lang="en-US" altLang="zh-CN" sz="1200" dirty="0">
+                <a:rPr kumimoji="1" lang="zh-CN" altLang="en-US" sz="1200" dirty="0" smtClean="0">
                   <a:solidFill>
                     <a:srgbClr val="D8D9E7"/>
                   </a:solidFill>
                   <a:cs typeface="Devanagari MT" panose="02000500020000000000" pitchFamily="2" charset="0"/>
                 </a:rPr>
-                <a:t>Protocol</a:t>
+                <a:t>协议</a:t>
               </a:r>
+              <a:endParaRPr kumimoji="1" lang="en-US" altLang="zh-CN" sz="1200" dirty="0" smtClean="0">
+                <a:solidFill>
+                  <a:srgbClr val="D8D9E7"/>
+                </a:solidFill>
+                <a:cs typeface="Devanagari MT" panose="02000500020000000000" pitchFamily="2" charset="0"/>
+              </a:endParaRPr>
             </a:p>
             <a:p>
               <a:pPr algn="ctr"/>
               <a:r>
-                <a:rPr kumimoji="1" lang="en-US" altLang="zh-CN" sz="1200" dirty="0">
-                  <a:solidFill>
-                    <a:srgbClr val="D8D9E7"/>
-                  </a:solidFill>
-                  <a:cs typeface="Devanagari MT" panose="02000500020000000000" pitchFamily="2" charset="0"/>
-                </a:rPr>
-                <a:t>with</a:t>
-              </a:r>
-              <a:r>
-                <a:rPr kumimoji="1" lang="zh-CN" altLang="en-US" sz="1200" dirty="0">
-                  <a:solidFill>
-                    <a:srgbClr val="D8D9E7"/>
-                  </a:solidFill>
-                  <a:cs typeface="Devanagari MT" panose="02000500020000000000" pitchFamily="2" charset="0"/>
-                </a:rPr>
-                <a:t> </a:t>
-              </a:r>
-              <a:r>
-                <a:rPr kumimoji="1" lang="en-US" altLang="zh-CN" sz="1200" dirty="0">
+                <a:rPr kumimoji="1" lang="en-US" altLang="zh-CN" sz="1200" dirty="0" smtClean="0">
                   <a:solidFill>
                     <a:srgbClr val="D8D9E7"/>
                   </a:solidFill>
@@ -23650,8 +23469,8 @@
           </p:nvSpPr>
           <p:spPr>
             <a:xfrm>
-              <a:off x="1586903" y="3904021"/>
-              <a:ext cx="790601" cy="324576"/>
+              <a:off x="1620565" y="3904021"/>
+              <a:ext cx="723275" cy="317395"/>
             </a:xfrm>
             <a:prstGeom prst="rect">
               <a:avLst/>
@@ -23670,14 +23489,14 @@
                 </a:lnSpc>
               </a:pPr>
               <a:r>
-                <a:rPr kumimoji="1" lang="en-US" altLang="zh-CN" sz="1400" dirty="0">
+                <a:rPr kumimoji="1" lang="zh-CN" altLang="en-US" sz="1400" dirty="0">
                   <a:solidFill>
                     <a:srgbClr val="737893"/>
                   </a:solidFill>
                   <a:latin typeface="Helvetica" pitchFamily="2" charset="0"/>
                   <a:cs typeface="Arial" panose="020B0604020202020204" pitchFamily="34" charset="0"/>
                 </a:rPr>
-                <a:t>Inverter</a:t>
+                <a:t>逆变器</a:t>
               </a:r>
               <a:endParaRPr kumimoji="1" lang="zh-CN" altLang="en-US" sz="1400" dirty="0">
                 <a:solidFill>
@@ -23703,8 +23522,8 @@
           </p:nvSpPr>
           <p:spPr>
             <a:xfrm>
-              <a:off x="3077828" y="3904021"/>
-              <a:ext cx="790601" cy="324576"/>
+              <a:off x="3111491" y="3904021"/>
+              <a:ext cx="723275" cy="317395"/>
             </a:xfrm>
             <a:prstGeom prst="rect">
               <a:avLst/>
@@ -23723,14 +23542,14 @@
                 </a:lnSpc>
               </a:pPr>
               <a:r>
-                <a:rPr kumimoji="1" lang="en-US" altLang="zh-CN" sz="1400" dirty="0">
+                <a:rPr kumimoji="1" lang="zh-CN" altLang="en-US" sz="1400" dirty="0" smtClean="0">
                   <a:solidFill>
                     <a:srgbClr val="737893"/>
                   </a:solidFill>
                   <a:latin typeface="Helvetica" pitchFamily="2" charset="0"/>
                   <a:cs typeface="Arial" panose="020B0604020202020204" pitchFamily="34" charset="0"/>
                 </a:rPr>
-                <a:t>Inverter</a:t>
+                <a:t>逆变器</a:t>
               </a:r>
               <a:endParaRPr kumimoji="1" lang="zh-CN" altLang="en-US" sz="1400" dirty="0">
                 <a:solidFill>
@@ -23756,8 +23575,8 @@
           </p:nvSpPr>
           <p:spPr>
             <a:xfrm>
-              <a:off x="4647563" y="3904021"/>
-              <a:ext cx="790601" cy="324576"/>
+              <a:off x="4681227" y="3904021"/>
+              <a:ext cx="723275" cy="317395"/>
             </a:xfrm>
             <a:prstGeom prst="rect">
               <a:avLst/>
@@ -23776,14 +23595,14 @@
                 </a:lnSpc>
               </a:pPr>
               <a:r>
-                <a:rPr kumimoji="1" lang="en-US" altLang="zh-CN" sz="1400" dirty="0">
+                <a:rPr kumimoji="1" lang="zh-CN" altLang="en-US" sz="1400" dirty="0" smtClean="0">
                   <a:solidFill>
                     <a:srgbClr val="737893"/>
                   </a:solidFill>
                   <a:latin typeface="Helvetica" pitchFamily="2" charset="0"/>
                   <a:cs typeface="Arial" panose="020B0604020202020204" pitchFamily="34" charset="0"/>
                 </a:rPr>
-                <a:t>Inverter</a:t>
+                <a:t>逆变器</a:t>
               </a:r>
               <a:endParaRPr kumimoji="1" lang="zh-CN" altLang="en-US" sz="1400" dirty="0">
                 <a:solidFill>
@@ -23809,8 +23628,8 @@
           </p:nvSpPr>
           <p:spPr>
             <a:xfrm>
-              <a:off x="6159184" y="3904021"/>
-              <a:ext cx="790601" cy="324576"/>
+              <a:off x="6192845" y="3904021"/>
+              <a:ext cx="723275" cy="317395"/>
             </a:xfrm>
             <a:prstGeom prst="rect">
               <a:avLst/>
@@ -23829,14 +23648,14 @@
                 </a:lnSpc>
               </a:pPr>
               <a:r>
-                <a:rPr kumimoji="1" lang="en-US" altLang="zh-CN" sz="1400" dirty="0">
+                <a:rPr kumimoji="1" lang="zh-CN" altLang="en-US" sz="1400" dirty="0">
                   <a:solidFill>
                     <a:srgbClr val="737893"/>
                   </a:solidFill>
                   <a:latin typeface="Helvetica" pitchFamily="2" charset="0"/>
                   <a:cs typeface="Arial" panose="020B0604020202020204" pitchFamily="34" charset="0"/>
                 </a:rPr>
-                <a:t>Inverter</a:t>
+                <a:t>逆变器</a:t>
               </a:r>
               <a:endParaRPr kumimoji="1" lang="zh-CN" altLang="en-US" sz="1400" dirty="0">
                 <a:solidFill>

</xml_diff>